<commit_message>
Merged Code of Alex and Nishanth
</commit_message>
<xml_diff>
--- a/FinalML/Project Presentation.pptx
+++ b/FinalML/Project Presentation.pptx
@@ -5405,7 +5405,33 @@
                     <a:ea typeface="Times New Roman" panose="02020603050405020304" pitchFamily="18" charset="0"/>
                     <a:cs typeface="Times New Roman" panose="02020603050405020304" pitchFamily="18" charset="0"/>
                   </a:rPr>
-                  <a:t>In this problem, we selected only </a:t>
+                  <a:t>In this problem, we selected </a:t>
+                </a:r>
+                <a:r>
+                  <a:rPr lang="en-IN" sz="1600">
+                    <a:effectLst/>
+                    <a:latin typeface="Calibri" panose="020F0502020204030204" pitchFamily="34" charset="0"/>
+                    <a:ea typeface="Times New Roman" panose="02020603050405020304" pitchFamily="18" charset="0"/>
+                    <a:cs typeface="Times New Roman" panose="02020603050405020304" pitchFamily="18" charset="0"/>
+                  </a:rPr>
+                  <a:t>only </a:t>
+                </a:r>
+                <a:r>
+                  <a:rPr lang="en-IN" sz="1600" b="1">
+                    <a:latin typeface="Calibri" panose="020F0502020204030204" pitchFamily="34" charset="0"/>
+                    <a:ea typeface="Times New Roman" panose="02020603050405020304" pitchFamily="18" charset="0"/>
+                    <a:cs typeface="Times New Roman" panose="02020603050405020304" pitchFamily="18" charset="0"/>
+                  </a:rPr>
+                  <a:t>9</a:t>
+                </a:r>
+                <a:r>
+                  <a:rPr lang="en-IN" sz="1600" b="1">
+                    <a:effectLst/>
+                    <a:latin typeface="Calibri" panose="020F0502020204030204" pitchFamily="34" charset="0"/>
+                    <a:ea typeface="Times New Roman" panose="02020603050405020304" pitchFamily="18" charset="0"/>
+                    <a:cs typeface="Times New Roman" panose="02020603050405020304" pitchFamily="18" charset="0"/>
+                  </a:rPr>
+                  <a:t> </a:t>
                 </a:r>
                 <a:r>
                   <a:rPr lang="en-IN" sz="1600" b="1" dirty="0">
@@ -5414,7 +5440,7 @@
                     <a:ea typeface="Times New Roman" panose="02020603050405020304" pitchFamily="18" charset="0"/>
                     <a:cs typeface="Times New Roman" panose="02020603050405020304" pitchFamily="18" charset="0"/>
                   </a:rPr>
-                  <a:t>10 features</a:t>
+                  <a:t>features</a:t>
                 </a:r>
                 <a:r>
                   <a:rPr lang="en-IN" sz="1600" dirty="0">
@@ -5637,8 +5663,8 @@
           </a:p>
         </p:txBody>
       </p:sp>
-      <mc:AlternateContent xmlns:mc="http://schemas.openxmlformats.org/markup-compatibility/2006">
-        <mc:Choice xmlns:a14="http://schemas.microsoft.com/office/drawing/2010/main" Requires="a14">
+      <mc:AlternateContent xmlns:mc="http://schemas.openxmlformats.org/markup-compatibility/2006" xmlns:a14="http://schemas.microsoft.com/office/drawing/2010/main">
+        <mc:Choice Requires="a14">
           <p:sp>
             <p:nvSpPr>
               <p:cNvPr id="3" name="Content Placeholder 2">
@@ -6957,7 +6983,7 @@
             </p:txBody>
           </p:sp>
         </mc:Choice>
-        <mc:Fallback>
+        <mc:Fallback xmlns="">
           <p:sp>
             <p:nvSpPr>
               <p:cNvPr id="3" name="Content Placeholder 2">

</xml_diff>